<commit_message>
updated with link to quiz
</commit_message>
<xml_diff>
--- a/ClassMaterials/CPU_Scheduling2/CPUScheduling2.pptx
+++ b/ClassMaterials/CPU_Scheduling2/CPUScheduling2.pptx
@@ -21,7 +21,7 @@
     <p:sldId id="263" r:id="rId9"/>
     <p:sldId id="276" r:id="rId10"/>
     <p:sldId id="264" r:id="rId11"/>
-    <p:sldId id="279" r:id="rId12"/>
+    <p:sldId id="281" r:id="rId12"/>
     <p:sldId id="265" r:id="rId13"/>
     <p:sldId id="277" r:id="rId14"/>
     <p:sldId id="266" r:id="rId15"/>
@@ -133,546 +133,6 @@
 </p:presentation>
 </file>
 
-<file path=ppt/revisionInfo.xml><?xml version="1.0" encoding="utf-8"?>
-<p1510:revInfo xmlns:a="http://schemas.openxmlformats.org/drawingml/2006/main" xmlns:r="http://schemas.openxmlformats.org/officeDocument/2006/relationships" xmlns:p1510="http://schemas.microsoft.com/office/powerpoint/2015/10/main">
-  <p1510:revLst>
-    <p1510:client id="{9F0C0119-4A4E-FD49-92D0-D1E0275E8FC9}" v="2" dt="2018-12-18T02:23:53.605"/>
-  </p1510:revLst>
-</p1510:revInfo>
-</file>
-
-<file path=ppt/changesInfos/changesInfo1.xml><?xml version="1.0" encoding="utf-8"?>
-<pc:chgInfo xmlns:a="http://schemas.openxmlformats.org/drawingml/2006/main" xmlns:r="http://schemas.openxmlformats.org/officeDocument/2006/relationships" xmlns:ac="http://schemas.microsoft.com/office/drawing/2013/main/command" xmlns:pc="http://schemas.microsoft.com/office/powerpoint/2013/main/command">
-  <pc:docChgLst>
-    <pc:chgData name="Song, Lixing" userId="d86a4794-d57c-4f6d-acee-3349d9d3edfc" providerId="ADAL" clId="{5E3F1545-9865-4D0C-9B6A-C53785E4F7ED}"/>
-  </pc:docChgLst>
-  <pc:docChgLst>
-    <pc:chgData name="Song, Lixing" userId="d86a4794-d57c-4f6d-acee-3349d9d3edfc" providerId="ADAL" clId="{C22CFC7D-4CFF-3949-BBCC-B4ADD21FB069}"/>
-  </pc:docChgLst>
-  <pc:docChgLst>
-    <pc:chgData name="Song, Lixing" userId="S::song3@rose-hulman.edu::d86a4794-d57c-4f6d-acee-3349d9d3edfc" providerId="AD" clId="Web-{A444728C-76FF-E237-8848-EF04C33607FA}"/>
-    <pc:docChg chg="addSld modSld sldOrd">
-      <pc:chgData name="Song, Lixing" userId="S::song3@rose-hulman.edu::d86a4794-d57c-4f6d-acee-3349d9d3edfc" providerId="AD" clId="Web-{A444728C-76FF-E237-8848-EF04C33607FA}" dt="2018-12-14T22:48:06.531" v="108" actId="20577"/>
-      <pc:docMkLst>
-        <pc:docMk/>
-      </pc:docMkLst>
-      <pc:sldChg chg="ord">
-        <pc:chgData name="Song, Lixing" userId="S::song3@rose-hulman.edu::d86a4794-d57c-4f6d-acee-3349d9d3edfc" providerId="AD" clId="Web-{A444728C-76FF-E237-8848-EF04C33607FA}" dt="2018-12-14T22:44:55.059" v="87"/>
-        <pc:sldMkLst>
-          <pc:docMk/>
-          <pc:sldMk cId="800275729" sldId="264"/>
-        </pc:sldMkLst>
-      </pc:sldChg>
-      <pc:sldChg chg="modSp">
-        <pc:chgData name="Song, Lixing" userId="S::song3@rose-hulman.edu::d86a4794-d57c-4f6d-acee-3349d9d3edfc" providerId="AD" clId="Web-{A444728C-76FF-E237-8848-EF04C33607FA}" dt="2018-12-14T22:45:13.688" v="92" actId="20577"/>
-        <pc:sldMkLst>
-          <pc:docMk/>
-          <pc:sldMk cId="2620615987" sldId="265"/>
-        </pc:sldMkLst>
-        <pc:spChg chg="mod">
-          <ac:chgData name="Song, Lixing" userId="S::song3@rose-hulman.edu::d86a4794-d57c-4f6d-acee-3349d9d3edfc" providerId="AD" clId="Web-{A444728C-76FF-E237-8848-EF04C33607FA}" dt="2018-12-14T22:45:13.688" v="92" actId="20577"/>
-          <ac:spMkLst>
-            <pc:docMk/>
-            <pc:sldMk cId="2620615987" sldId="265"/>
-            <ac:spMk id="195" creationId="{00000000-0000-0000-0000-000000000000}"/>
-          </ac:spMkLst>
-        </pc:spChg>
-      </pc:sldChg>
-      <pc:sldChg chg="modSp">
-        <pc:chgData name="Song, Lixing" userId="S::song3@rose-hulman.edu::d86a4794-d57c-4f6d-acee-3349d9d3edfc" providerId="AD" clId="Web-{A444728C-76FF-E237-8848-EF04C33607FA}" dt="2018-12-14T22:47:19.077" v="102" actId="20577"/>
-        <pc:sldMkLst>
-          <pc:docMk/>
-          <pc:sldMk cId="319598819" sldId="266"/>
-        </pc:sldMkLst>
-        <pc:spChg chg="mod">
-          <ac:chgData name="Song, Lixing" userId="S::song3@rose-hulman.edu::d86a4794-d57c-4f6d-acee-3349d9d3edfc" providerId="AD" clId="Web-{A444728C-76FF-E237-8848-EF04C33607FA}" dt="2018-12-14T22:47:19.077" v="102" actId="20577"/>
-          <ac:spMkLst>
-            <pc:docMk/>
-            <pc:sldMk cId="319598819" sldId="266"/>
-            <ac:spMk id="226" creationId="{00000000-0000-0000-0000-000000000000}"/>
-          </ac:spMkLst>
-        </pc:spChg>
-      </pc:sldChg>
-      <pc:sldChg chg="modSp">
-        <pc:chgData name="Song, Lixing" userId="S::song3@rose-hulman.edu::d86a4794-d57c-4f6d-acee-3349d9d3edfc" providerId="AD" clId="Web-{A444728C-76FF-E237-8848-EF04C33607FA}" dt="2018-12-14T22:48:06.531" v="108" actId="20577"/>
-        <pc:sldMkLst>
-          <pc:docMk/>
-          <pc:sldMk cId="2603308066" sldId="269"/>
-        </pc:sldMkLst>
-        <pc:spChg chg="mod">
-          <ac:chgData name="Song, Lixing" userId="S::song3@rose-hulman.edu::d86a4794-d57c-4f6d-acee-3349d9d3edfc" providerId="AD" clId="Web-{A444728C-76FF-E237-8848-EF04C33607FA}" dt="2018-12-14T22:48:06.531" v="108" actId="20577"/>
-          <ac:spMkLst>
-            <pc:docMk/>
-            <pc:sldMk cId="2603308066" sldId="269"/>
-            <ac:spMk id="259" creationId="{00000000-0000-0000-0000-000000000000}"/>
-          </ac:spMkLst>
-        </pc:spChg>
-      </pc:sldChg>
-      <pc:sldChg chg="modSp">
-        <pc:chgData name="Song, Lixing" userId="S::song3@rose-hulman.edu::d86a4794-d57c-4f6d-acee-3349d9d3edfc" providerId="AD" clId="Web-{A444728C-76FF-E237-8848-EF04C33607FA}" dt="2018-12-14T22:46:16.716" v="99" actId="20577"/>
-        <pc:sldMkLst>
-          <pc:docMk/>
-          <pc:sldMk cId="1658902916" sldId="276"/>
-        </pc:sldMkLst>
-        <pc:spChg chg="mod">
-          <ac:chgData name="Song, Lixing" userId="S::song3@rose-hulman.edu::d86a4794-d57c-4f6d-acee-3349d9d3edfc" providerId="AD" clId="Web-{A444728C-76FF-E237-8848-EF04C33607FA}" dt="2018-12-14T22:46:16.716" v="99" actId="20577"/>
-          <ac:spMkLst>
-            <pc:docMk/>
-            <pc:sldMk cId="1658902916" sldId="276"/>
-            <ac:spMk id="125" creationId="{00000000-0000-0000-0000-000000000000}"/>
-          </ac:spMkLst>
-        </pc:spChg>
-      </pc:sldChg>
-      <pc:sldChg chg="modSp">
-        <pc:chgData name="Song, Lixing" userId="S::song3@rose-hulman.edu::d86a4794-d57c-4f6d-acee-3349d9d3edfc" providerId="AD" clId="Web-{A444728C-76FF-E237-8848-EF04C33607FA}" dt="2018-12-14T22:45:28.106" v="94" actId="20577"/>
-        <pc:sldMkLst>
-          <pc:docMk/>
-          <pc:sldMk cId="1480739642" sldId="277"/>
-        </pc:sldMkLst>
-        <pc:spChg chg="mod">
-          <ac:chgData name="Song, Lixing" userId="S::song3@rose-hulman.edu::d86a4794-d57c-4f6d-acee-3349d9d3edfc" providerId="AD" clId="Web-{A444728C-76FF-E237-8848-EF04C33607FA}" dt="2018-12-14T22:45:28.106" v="94" actId="20577"/>
-          <ac:spMkLst>
-            <pc:docMk/>
-            <pc:sldMk cId="1480739642" sldId="277"/>
-            <ac:spMk id="125" creationId="{00000000-0000-0000-0000-000000000000}"/>
-          </ac:spMkLst>
-        </pc:spChg>
-      </pc:sldChg>
-      <pc:sldChg chg="modSp">
-        <pc:chgData name="Song, Lixing" userId="S::song3@rose-hulman.edu::d86a4794-d57c-4f6d-acee-3349d9d3edfc" providerId="AD" clId="Web-{A444728C-76FF-E237-8848-EF04C33607FA}" dt="2018-12-14T22:47:24.217" v="103" actId="20577"/>
-        <pc:sldMkLst>
-          <pc:docMk/>
-          <pc:sldMk cId="2518279147" sldId="278"/>
-        </pc:sldMkLst>
-        <pc:spChg chg="mod">
-          <ac:chgData name="Song, Lixing" userId="S::song3@rose-hulman.edu::d86a4794-d57c-4f6d-acee-3349d9d3edfc" providerId="AD" clId="Web-{A444728C-76FF-E237-8848-EF04C33607FA}" dt="2018-12-14T22:47:24.217" v="103" actId="20577"/>
-          <ac:spMkLst>
-            <pc:docMk/>
-            <pc:sldMk cId="2518279147" sldId="278"/>
-            <ac:spMk id="125" creationId="{00000000-0000-0000-0000-000000000000}"/>
-          </ac:spMkLst>
-        </pc:spChg>
-      </pc:sldChg>
-      <pc:sldChg chg="addSp delSp modSp new addAnim modAnim">
-        <pc:chgData name="Song, Lixing" userId="S::song3@rose-hulman.edu::d86a4794-d57c-4f6d-acee-3349d9d3edfc" providerId="AD" clId="Web-{A444728C-76FF-E237-8848-EF04C33607FA}" dt="2018-12-14T22:42:55.054" v="86"/>
-        <pc:sldMkLst>
-          <pc:docMk/>
-          <pc:sldMk cId="2359537052" sldId="280"/>
-        </pc:sldMkLst>
-        <pc:spChg chg="mod">
-          <ac:chgData name="Song, Lixing" userId="S::song3@rose-hulman.edu::d86a4794-d57c-4f6d-acee-3349d9d3edfc" providerId="AD" clId="Web-{A444728C-76FF-E237-8848-EF04C33607FA}" dt="2018-12-14T22:38:48.111" v="17" actId="20577"/>
-          <ac:spMkLst>
-            <pc:docMk/>
-            <pc:sldMk cId="2359537052" sldId="280"/>
-            <ac:spMk id="2" creationId="{E0C7A89C-E360-46FF-B524-87DEDE9707D6}"/>
-          </ac:spMkLst>
-        </pc:spChg>
-        <pc:spChg chg="mod">
-          <ac:chgData name="Song, Lixing" userId="S::song3@rose-hulman.edu::d86a4794-d57c-4f6d-acee-3349d9d3edfc" providerId="AD" clId="Web-{A444728C-76FF-E237-8848-EF04C33607FA}" dt="2018-12-14T22:41:22.320" v="83" actId="14100"/>
-          <ac:spMkLst>
-            <pc:docMk/>
-            <pc:sldMk cId="2359537052" sldId="280"/>
-            <ac:spMk id="3" creationId="{A5AADD4E-56C9-44B3-8E68-87BB9081302D}"/>
-          </ac:spMkLst>
-        </pc:spChg>
-        <pc:spChg chg="add del mod">
-          <ac:chgData name="Song, Lixing" userId="S::song3@rose-hulman.edu::d86a4794-d57c-4f6d-acee-3349d9d3edfc" providerId="AD" clId="Web-{A444728C-76FF-E237-8848-EF04C33607FA}" dt="2018-12-14T22:42:55.054" v="86"/>
-          <ac:spMkLst>
-            <pc:docMk/>
-            <pc:sldMk cId="2359537052" sldId="280"/>
-            <ac:spMk id="4" creationId="{F988173A-B9C4-472A-8A7E-7C36896AD779}"/>
-          </ac:spMkLst>
-        </pc:spChg>
-      </pc:sldChg>
-    </pc:docChg>
-  </pc:docChgLst>
-  <pc:docChgLst>
-    <pc:chgData name="Song, Lixing" userId="d86a4794-d57c-4f6d-acee-3349d9d3edfc" providerId="ADAL" clId="{9E87C597-9CCC-9D40-AF98-FA57E59EE777}"/>
-    <pc:docChg chg="modSld">
-      <pc:chgData name="Song, Lixing" userId="d86a4794-d57c-4f6d-acee-3349d9d3edfc" providerId="ADAL" clId="{9E87C597-9CCC-9D40-AF98-FA57E59EE777}" dt="2018-09-26T18:24:13.941" v="21" actId="20577"/>
-      <pc:docMkLst>
-        <pc:docMk/>
-      </pc:docMkLst>
-    </pc:docChg>
-  </pc:docChgLst>
-  <pc:docChgLst>
-    <pc:chgData name="Hewner, Michael P" userId="S::hewner@rose-hulman.edu::7f3f83dd-6dfb-4127-a87f-c1714bd4fac9" providerId="AD" clId="Web-{BED898F0-5C4E-4E2B-05B8-62EB02E2E38B}"/>
-    <pc:docChg chg="modSld">
-      <pc:chgData name="Hewner, Michael P" userId="S::hewner@rose-hulman.edu::7f3f83dd-6dfb-4127-a87f-c1714bd4fac9" providerId="AD" clId="Web-{BED898F0-5C4E-4E2B-05B8-62EB02E2E38B}" dt="2018-12-18T12:49:30.248" v="8" actId="20577"/>
-      <pc:docMkLst>
-        <pc:docMk/>
-      </pc:docMkLst>
-      <pc:sldChg chg="modSp">
-        <pc:chgData name="Hewner, Michael P" userId="S::hewner@rose-hulman.edu::7f3f83dd-6dfb-4127-a87f-c1714bd4fac9" providerId="AD" clId="Web-{BED898F0-5C4E-4E2B-05B8-62EB02E2E38B}" dt="2018-12-18T12:49:28.358" v="6" actId="20577"/>
-        <pc:sldMkLst>
-          <pc:docMk/>
-          <pc:sldMk cId="2079174257" sldId="279"/>
-        </pc:sldMkLst>
-        <pc:spChg chg="mod">
-          <ac:chgData name="Hewner, Michael P" userId="S::hewner@rose-hulman.edu::7f3f83dd-6dfb-4127-a87f-c1714bd4fac9" providerId="AD" clId="Web-{BED898F0-5C4E-4E2B-05B8-62EB02E2E38B}" dt="2018-12-18T12:49:28.358" v="6" actId="20577"/>
-          <ac:spMkLst>
-            <pc:docMk/>
-            <pc:sldMk cId="2079174257" sldId="279"/>
-            <ac:spMk id="2" creationId="{C590BAF5-6A35-4A85-A3BE-04B99FCF8983}"/>
-          </ac:spMkLst>
-        </pc:spChg>
-      </pc:sldChg>
-    </pc:docChg>
-  </pc:docChgLst>
-  <pc:docChgLst>
-    <pc:chgData name="Song, Lixing" userId="d86a4794-d57c-4f6d-acee-3349d9d3edfc" providerId="ADAL" clId="{DE510D8C-7A8F-4C1E-B129-432EFF16AAA3}"/>
-    <pc:docChg chg="undo custSel addSld delSld modSld">
-      <pc:chgData name="Song, Lixing" userId="d86a4794-d57c-4f6d-acee-3349d9d3edfc" providerId="ADAL" clId="{DE510D8C-7A8F-4C1E-B129-432EFF16AAA3}" dt="2018-12-14T01:32:59.152" v="187" actId="2696"/>
-      <pc:docMkLst>
-        <pc:docMk/>
-      </pc:docMkLst>
-      <pc:sldChg chg="modSp">
-        <pc:chgData name="Song, Lixing" userId="d86a4794-d57c-4f6d-acee-3349d9d3edfc" providerId="ADAL" clId="{DE510D8C-7A8F-4C1E-B129-432EFF16AAA3}" dt="2018-12-14T01:14:29.484" v="1" actId="20577"/>
-        <pc:sldMkLst>
-          <pc:docMk/>
-          <pc:sldMk cId="4094529012" sldId="261"/>
-        </pc:sldMkLst>
-        <pc:spChg chg="mod">
-          <ac:chgData name="Song, Lixing" userId="d86a4794-d57c-4f6d-acee-3349d9d3edfc" providerId="ADAL" clId="{DE510D8C-7A8F-4C1E-B129-432EFF16AAA3}" dt="2018-12-14T01:14:29.484" v="1" actId="20577"/>
-          <ac:spMkLst>
-            <pc:docMk/>
-            <pc:sldMk cId="4094529012" sldId="261"/>
-            <ac:spMk id="126" creationId="{00000000-0000-0000-0000-000000000000}"/>
-          </ac:spMkLst>
-        </pc:spChg>
-      </pc:sldChg>
-      <pc:sldChg chg="modSp">
-        <pc:chgData name="Song, Lixing" userId="d86a4794-d57c-4f6d-acee-3349d9d3edfc" providerId="ADAL" clId="{DE510D8C-7A8F-4C1E-B129-432EFF16AAA3}" dt="2018-12-14T01:21:05.346" v="57" actId="14100"/>
-        <pc:sldMkLst>
-          <pc:docMk/>
-          <pc:sldMk cId="2620615987" sldId="265"/>
-        </pc:sldMkLst>
-        <pc:spChg chg="mod">
-          <ac:chgData name="Song, Lixing" userId="d86a4794-d57c-4f6d-acee-3349d9d3edfc" providerId="ADAL" clId="{DE510D8C-7A8F-4C1E-B129-432EFF16AAA3}" dt="2018-12-14T01:20:17.595" v="54" actId="1076"/>
-          <ac:spMkLst>
-            <pc:docMk/>
-            <pc:sldMk cId="2620615987" sldId="265"/>
-            <ac:spMk id="196" creationId="{00000000-0000-0000-0000-000000000000}"/>
-          </ac:spMkLst>
-        </pc:spChg>
-        <pc:spChg chg="mod">
-          <ac:chgData name="Song, Lixing" userId="d86a4794-d57c-4f6d-acee-3349d9d3edfc" providerId="ADAL" clId="{DE510D8C-7A8F-4C1E-B129-432EFF16AAA3}" dt="2018-12-14T01:21:05.346" v="57" actId="14100"/>
-          <ac:spMkLst>
-            <pc:docMk/>
-            <pc:sldMk cId="2620615987" sldId="265"/>
-            <ac:spMk id="221" creationId="{00000000-0000-0000-0000-000000000000}"/>
-          </ac:spMkLst>
-        </pc:spChg>
-      </pc:sldChg>
-      <pc:sldChg chg="modSp add">
-        <pc:chgData name="Song, Lixing" userId="d86a4794-d57c-4f6d-acee-3349d9d3edfc" providerId="ADAL" clId="{DE510D8C-7A8F-4C1E-B129-432EFF16AAA3}" dt="2018-12-14T01:30:15.879" v="94" actId="20577"/>
-        <pc:sldMkLst>
-          <pc:docMk/>
-          <pc:sldMk cId="1658902916" sldId="276"/>
-        </pc:sldMkLst>
-        <pc:spChg chg="mod">
-          <ac:chgData name="Song, Lixing" userId="d86a4794-d57c-4f6d-acee-3349d9d3edfc" providerId="ADAL" clId="{DE510D8C-7A8F-4C1E-B129-432EFF16AAA3}" dt="2018-12-14T01:30:15.879" v="94" actId="20577"/>
-          <ac:spMkLst>
-            <pc:docMk/>
-            <pc:sldMk cId="1658902916" sldId="276"/>
-            <ac:spMk id="126" creationId="{00000000-0000-0000-0000-000000000000}"/>
-          </ac:spMkLst>
-        </pc:spChg>
-      </pc:sldChg>
-      <pc:sldChg chg="modSp add">
-        <pc:chgData name="Song, Lixing" userId="d86a4794-d57c-4f6d-acee-3349d9d3edfc" providerId="ADAL" clId="{DE510D8C-7A8F-4C1E-B129-432EFF16AAA3}" dt="2018-12-14T01:30:10.053" v="93" actId="20577"/>
-        <pc:sldMkLst>
-          <pc:docMk/>
-          <pc:sldMk cId="1480739642" sldId="277"/>
-        </pc:sldMkLst>
-        <pc:spChg chg="mod">
-          <ac:chgData name="Song, Lixing" userId="d86a4794-d57c-4f6d-acee-3349d9d3edfc" providerId="ADAL" clId="{DE510D8C-7A8F-4C1E-B129-432EFF16AAA3}" dt="2018-12-14T01:30:10.053" v="93" actId="20577"/>
-          <ac:spMkLst>
-            <pc:docMk/>
-            <pc:sldMk cId="1480739642" sldId="277"/>
-            <ac:spMk id="126" creationId="{00000000-0000-0000-0000-000000000000}"/>
-          </ac:spMkLst>
-        </pc:spChg>
-      </pc:sldChg>
-      <pc:sldChg chg="modSp add">
-        <pc:chgData name="Song, Lixing" userId="d86a4794-d57c-4f6d-acee-3349d9d3edfc" providerId="ADAL" clId="{DE510D8C-7A8F-4C1E-B129-432EFF16AAA3}" dt="2018-12-14T01:32:40.830" v="183" actId="12"/>
-        <pc:sldMkLst>
-          <pc:docMk/>
-          <pc:sldMk cId="2518279147" sldId="278"/>
-        </pc:sldMkLst>
-        <pc:spChg chg="mod">
-          <ac:chgData name="Song, Lixing" userId="d86a4794-d57c-4f6d-acee-3349d9d3edfc" providerId="ADAL" clId="{DE510D8C-7A8F-4C1E-B129-432EFF16AAA3}" dt="2018-12-14T01:30:45.686" v="114" actId="20577"/>
-          <ac:spMkLst>
-            <pc:docMk/>
-            <pc:sldMk cId="2518279147" sldId="278"/>
-            <ac:spMk id="125" creationId="{00000000-0000-0000-0000-000000000000}"/>
-          </ac:spMkLst>
-        </pc:spChg>
-        <pc:spChg chg="mod">
-          <ac:chgData name="Song, Lixing" userId="d86a4794-d57c-4f6d-acee-3349d9d3edfc" providerId="ADAL" clId="{DE510D8C-7A8F-4C1E-B129-432EFF16AAA3}" dt="2018-12-14T01:32:40.830" v="183" actId="12"/>
-          <ac:spMkLst>
-            <pc:docMk/>
-            <pc:sldMk cId="2518279147" sldId="278"/>
-            <ac:spMk id="126" creationId="{00000000-0000-0000-0000-000000000000}"/>
-          </ac:spMkLst>
-        </pc:spChg>
-      </pc:sldChg>
-    </pc:docChg>
-  </pc:docChgLst>
-  <pc:docChgLst>
-    <pc:chgData name="Song, Lixing" userId="d86a4794-d57c-4f6d-acee-3349d9d3edfc" providerId="ADAL" clId="{3DB7AE05-0F07-FE4F-998C-F915C7572059}"/>
-  </pc:docChgLst>
-  <pc:docChgLst>
-    <pc:chgData name="Song, Lixing" userId="d86a4794-d57c-4f6d-acee-3349d9d3edfc" providerId="ADAL" clId="{41CAD8FE-0633-0C44-91B6-9FBD914D6317}"/>
-  </pc:docChgLst>
-  <pc:docChgLst>
-    <pc:chgData name="Song, Lixing" userId="d86a4794-d57c-4f6d-acee-3349d9d3edfc" providerId="ADAL" clId="{E6A4A57A-7BA1-4943-B287-0650F3813B88}"/>
-  </pc:docChgLst>
-  <pc:docChgLst>
-    <pc:chgData name="Hewner, Michael P" userId="S::hewner@rose-hulman.edu::7f3f83dd-6dfb-4127-a87f-c1714bd4fac9" providerId="AD" clId="Web-{8A75AB8D-89EF-8CD1-A468-00DA4915BB3A}"/>
-    <pc:docChg chg="addSld modSld">
-      <pc:chgData name="Hewner, Michael P" userId="S::hewner@rose-hulman.edu::7f3f83dd-6dfb-4127-a87f-c1714bd4fac9" providerId="AD" clId="Web-{8A75AB8D-89EF-8CD1-A468-00DA4915BB3A}" dt="2018-12-14T19:47:49.507" v="13" actId="20577"/>
-      <pc:docMkLst>
-        <pc:docMk/>
-      </pc:docMkLst>
-      <pc:sldChg chg="modSp">
-        <pc:chgData name="Hewner, Michael P" userId="S::hewner@rose-hulman.edu::7f3f83dd-6dfb-4127-a87f-c1714bd4fac9" providerId="AD" clId="Web-{8A75AB8D-89EF-8CD1-A468-00DA4915BB3A}" dt="2018-12-14T19:14:32.473" v="7" actId="20577"/>
-        <pc:sldMkLst>
-          <pc:docMk/>
-          <pc:sldMk cId="745928513" sldId="257"/>
-        </pc:sldMkLst>
-        <pc:spChg chg="mod">
-          <ac:chgData name="Hewner, Michael P" userId="S::hewner@rose-hulman.edu::7f3f83dd-6dfb-4127-a87f-c1714bd4fac9" providerId="AD" clId="Web-{8A75AB8D-89EF-8CD1-A468-00DA4915BB3A}" dt="2018-12-14T19:14:32.473" v="7" actId="20577"/>
-          <ac:spMkLst>
-            <pc:docMk/>
-            <pc:sldMk cId="745928513" sldId="257"/>
-            <ac:spMk id="85" creationId="{00000000-0000-0000-0000-000000000000}"/>
-          </ac:spMkLst>
-        </pc:spChg>
-      </pc:sldChg>
-      <pc:sldChg chg="modSp new">
-        <pc:chgData name="Hewner, Michael P" userId="S::hewner@rose-hulman.edu::7f3f83dd-6dfb-4127-a87f-c1714bd4fac9" providerId="AD" clId="Web-{8A75AB8D-89EF-8CD1-A468-00DA4915BB3A}" dt="2018-12-14T19:47:48.585" v="11" actId="20577"/>
-        <pc:sldMkLst>
-          <pc:docMk/>
-          <pc:sldMk cId="2079174257" sldId="279"/>
-        </pc:sldMkLst>
-        <pc:spChg chg="mod">
-          <ac:chgData name="Hewner, Michael P" userId="S::hewner@rose-hulman.edu::7f3f83dd-6dfb-4127-a87f-c1714bd4fac9" providerId="AD" clId="Web-{8A75AB8D-89EF-8CD1-A468-00DA4915BB3A}" dt="2018-12-14T19:47:48.585" v="11" actId="20577"/>
-          <ac:spMkLst>
-            <pc:docMk/>
-            <pc:sldMk cId="2079174257" sldId="279"/>
-            <ac:spMk id="2" creationId="{C590BAF5-6A35-4A85-A3BE-04B99FCF8983}"/>
-          </ac:spMkLst>
-        </pc:spChg>
-      </pc:sldChg>
-    </pc:docChg>
-  </pc:docChgLst>
-  <pc:docChgLst>
-    <pc:chgData name="Song, Lixing" userId="d86a4794-d57c-4f6d-acee-3349d9d3edfc" providerId="ADAL" clId="{63E5B0BA-7CA7-664C-A874-0CD1DDB96575}"/>
-  </pc:docChgLst>
-  <pc:docChgLst>
-    <pc:chgData name="Song, Lixing" userId="d86a4794-d57c-4f6d-acee-3349d9d3edfc" providerId="ADAL" clId="{57BE710F-CAAC-5C4C-B1E2-33D10347FAC9}"/>
-  </pc:docChgLst>
-  <pc:docChgLst>
-    <pc:chgData name="Song, Lixing" userId="d86a4794-d57c-4f6d-acee-3349d9d3edfc" providerId="ADAL" clId="{5D69B093-118D-1741-8919-161214198A6C}"/>
-    <pc:docChg chg="undo custSel addSld delSld modSld">
-      <pc:chgData name="Song, Lixing" userId="d86a4794-d57c-4f6d-acee-3349d9d3edfc" providerId="ADAL" clId="{5D69B093-118D-1741-8919-161214198A6C}" dt="2018-10-08T14:52:20.870" v="255" actId="2696"/>
-      <pc:docMkLst>
-        <pc:docMk/>
-      </pc:docMkLst>
-      <pc:sldChg chg="addSp modSp">
-        <pc:chgData name="Song, Lixing" userId="d86a4794-d57c-4f6d-acee-3349d9d3edfc" providerId="ADAL" clId="{5D69B093-118D-1741-8919-161214198A6C}" dt="2018-10-08T14:41:12.478" v="228" actId="1076"/>
-        <pc:sldMkLst>
-          <pc:docMk/>
-          <pc:sldMk cId="25011158" sldId="256"/>
-        </pc:sldMkLst>
-        <pc:spChg chg="mod">
-          <ac:chgData name="Song, Lixing" userId="d86a4794-d57c-4f6d-acee-3349d9d3edfc" providerId="ADAL" clId="{5D69B093-118D-1741-8919-161214198A6C}" dt="2018-10-01T13:59:23.193" v="17" actId="20577"/>
-          <ac:spMkLst>
-            <pc:docMk/>
-            <pc:sldMk cId="25011158" sldId="256"/>
-            <ac:spMk id="2" creationId="{6DDA001A-43E3-1449-893B-948F2BFF68B6}"/>
-          </ac:spMkLst>
-        </pc:spChg>
-        <pc:spChg chg="add mod">
-          <ac:chgData name="Song, Lixing" userId="d86a4794-d57c-4f6d-acee-3349d9d3edfc" providerId="ADAL" clId="{5D69B093-118D-1741-8919-161214198A6C}" dt="2018-10-08T14:41:12.478" v="228" actId="1076"/>
-          <ac:spMkLst>
-            <pc:docMk/>
-            <pc:sldMk cId="25011158" sldId="256"/>
-            <ac:spMk id="4" creationId="{274FCC87-5C4D-5848-8347-13F19BA1FA30}"/>
-          </ac:spMkLst>
-        </pc:spChg>
-      </pc:sldChg>
-    </pc:docChg>
-  </pc:docChgLst>
-  <pc:docChgLst>
-    <pc:chgData name="Song, Lixing" userId="d86a4794-d57c-4f6d-acee-3349d9d3edfc" providerId="ADAL" clId="{DE4E7ECB-2978-1244-B374-6C6C0AE9F7D6}"/>
-  </pc:docChgLst>
-  <pc:docChgLst>
-    <pc:chgData name="Song, Lixing" userId="d86a4794-d57c-4f6d-acee-3349d9d3edfc" providerId="ADAL" clId="{6256184C-17FA-4944-87C5-3041B62521D9}"/>
-  </pc:docChgLst>
-  <pc:docChgLst>
-    <pc:chgData name="Song, Lixing" userId="d86a4794-d57c-4f6d-acee-3349d9d3edfc" providerId="ADAL" clId="{560DAE8F-EC11-0B4B-88CC-7E2C494E737F}"/>
-    <pc:docChg chg="undo redo custSel addSld delSld modSld sldOrd modMainMaster">
-      <pc:chgData name="Song, Lixing" userId="d86a4794-d57c-4f6d-acee-3349d9d3edfc" providerId="ADAL" clId="{560DAE8F-EC11-0B4B-88CC-7E2C494E737F}" dt="2018-09-19T17:12:10.784" v="317" actId="1076"/>
-      <pc:docMkLst>
-        <pc:docMk/>
-      </pc:docMkLst>
-    </pc:docChg>
-  </pc:docChgLst>
-  <pc:docChgLst>
-    <pc:chgData name="Song, Lixing" userId="d86a4794-d57c-4f6d-acee-3349d9d3edfc" providerId="ADAL" clId="{9F0C0119-4A4E-FD49-92D0-D1E0275E8FC9}"/>
-    <pc:docChg chg="modSld">
-      <pc:chgData name="Song, Lixing" userId="d86a4794-d57c-4f6d-acee-3349d9d3edfc" providerId="ADAL" clId="{9F0C0119-4A4E-FD49-92D0-D1E0275E8FC9}" dt="2018-12-18T02:23:53.605" v="50"/>
-      <pc:docMkLst>
-        <pc:docMk/>
-      </pc:docMkLst>
-      <pc:sldChg chg="addSp modSp modAnim">
-        <pc:chgData name="Song, Lixing" userId="d86a4794-d57c-4f6d-acee-3349d9d3edfc" providerId="ADAL" clId="{9F0C0119-4A4E-FD49-92D0-D1E0275E8FC9}" dt="2018-12-18T02:23:53.605" v="50"/>
-        <pc:sldMkLst>
-          <pc:docMk/>
-          <pc:sldMk cId="4094529012" sldId="261"/>
-        </pc:sldMkLst>
-        <pc:spChg chg="add mod">
-          <ac:chgData name="Song, Lixing" userId="d86a4794-d57c-4f6d-acee-3349d9d3edfc" providerId="ADAL" clId="{9F0C0119-4A4E-FD49-92D0-D1E0275E8FC9}" dt="2018-12-18T02:23:49.653" v="49" actId="1076"/>
-          <ac:spMkLst>
-            <pc:docMk/>
-            <pc:sldMk cId="4094529012" sldId="261"/>
-            <ac:spMk id="2" creationId="{6698B890-D332-2D40-BA81-DB6AE9295C2A}"/>
-          </ac:spMkLst>
-        </pc:spChg>
-      </pc:sldChg>
-    </pc:docChg>
-  </pc:docChgLst>
-  <pc:docChgLst>
-    <pc:chgData name="Song, Lixing" userId="d86a4794-d57c-4f6d-acee-3349d9d3edfc" providerId="ADAL" clId="{15F38F77-5154-6344-B0CC-E8BE3C6E9BB9}"/>
-    <pc:docChg chg="addSld delSld modSld">
-      <pc:chgData name="Song, Lixing" userId="d86a4794-d57c-4f6d-acee-3349d9d3edfc" providerId="ADAL" clId="{15F38F77-5154-6344-B0CC-E8BE3C6E9BB9}" dt="2018-10-08T14:56:24.500" v="24" actId="14100"/>
-      <pc:docMkLst>
-        <pc:docMk/>
-      </pc:docMkLst>
-      <pc:sldChg chg="modSp">
-        <pc:chgData name="Song, Lixing" userId="d86a4794-d57c-4f6d-acee-3349d9d3edfc" providerId="ADAL" clId="{15F38F77-5154-6344-B0CC-E8BE3C6E9BB9}" dt="2018-10-08T14:54:26.673" v="4" actId="20577"/>
-        <pc:sldMkLst>
-          <pc:docMk/>
-          <pc:sldMk cId="25011158" sldId="256"/>
-        </pc:sldMkLst>
-        <pc:spChg chg="mod">
-          <ac:chgData name="Song, Lixing" userId="d86a4794-d57c-4f6d-acee-3349d9d3edfc" providerId="ADAL" clId="{15F38F77-5154-6344-B0CC-E8BE3C6E9BB9}" dt="2018-10-08T14:54:26.673" v="4" actId="20577"/>
-          <ac:spMkLst>
-            <pc:docMk/>
-            <pc:sldMk cId="25011158" sldId="256"/>
-            <ac:spMk id="2" creationId="{6DDA001A-43E3-1449-893B-948F2BFF68B6}"/>
-          </ac:spMkLst>
-        </pc:spChg>
-      </pc:sldChg>
-      <pc:sldChg chg="add">
-        <pc:chgData name="Song, Lixing" userId="d86a4794-d57c-4f6d-acee-3349d9d3edfc" providerId="ADAL" clId="{15F38F77-5154-6344-B0CC-E8BE3C6E9BB9}" dt="2018-10-08T14:54:45.414" v="14"/>
-        <pc:sldMkLst>
-          <pc:docMk/>
-          <pc:sldMk cId="745928513" sldId="257"/>
-        </pc:sldMkLst>
-      </pc:sldChg>
-      <pc:sldChg chg="add">
-        <pc:chgData name="Song, Lixing" userId="d86a4794-d57c-4f6d-acee-3349d9d3edfc" providerId="ADAL" clId="{15F38F77-5154-6344-B0CC-E8BE3C6E9BB9}" dt="2018-10-08T14:54:45.414" v="14"/>
-        <pc:sldMkLst>
-          <pc:docMk/>
-          <pc:sldMk cId="3919723481" sldId="259"/>
-        </pc:sldMkLst>
-      </pc:sldChg>
-      <pc:sldChg chg="modSp add">
-        <pc:chgData name="Song, Lixing" userId="d86a4794-d57c-4f6d-acee-3349d9d3edfc" providerId="ADAL" clId="{15F38F77-5154-6344-B0CC-E8BE3C6E9BB9}" dt="2018-10-08T14:55:43.775" v="22" actId="14100"/>
-        <pc:sldMkLst>
-          <pc:docMk/>
-          <pc:sldMk cId="2602197214" sldId="260"/>
-        </pc:sldMkLst>
-        <pc:spChg chg="mod">
-          <ac:chgData name="Song, Lixing" userId="d86a4794-d57c-4f6d-acee-3349d9d3edfc" providerId="ADAL" clId="{15F38F77-5154-6344-B0CC-E8BE3C6E9BB9}" dt="2018-10-08T14:55:43.775" v="22" actId="14100"/>
-          <ac:spMkLst>
-            <pc:docMk/>
-            <pc:sldMk cId="2602197214" sldId="260"/>
-            <ac:spMk id="102" creationId="{00000000-0000-0000-0000-000000000000}"/>
-          </ac:spMkLst>
-        </pc:spChg>
-      </pc:sldChg>
-      <pc:sldChg chg="add">
-        <pc:chgData name="Song, Lixing" userId="d86a4794-d57c-4f6d-acee-3349d9d3edfc" providerId="ADAL" clId="{15F38F77-5154-6344-B0CC-E8BE3C6E9BB9}" dt="2018-10-08T14:54:45.414" v="14"/>
-        <pc:sldMkLst>
-          <pc:docMk/>
-          <pc:sldMk cId="4094529012" sldId="261"/>
-        </pc:sldMkLst>
-      </pc:sldChg>
-      <pc:sldChg chg="add">
-        <pc:chgData name="Song, Lixing" userId="d86a4794-d57c-4f6d-acee-3349d9d3edfc" providerId="ADAL" clId="{15F38F77-5154-6344-B0CC-E8BE3C6E9BB9}" dt="2018-10-08T14:54:45.414" v="14"/>
-        <pc:sldMkLst>
-          <pc:docMk/>
-          <pc:sldMk cId="165190490" sldId="262"/>
-        </pc:sldMkLst>
-      </pc:sldChg>
-      <pc:sldChg chg="add">
-        <pc:chgData name="Song, Lixing" userId="d86a4794-d57c-4f6d-acee-3349d9d3edfc" providerId="ADAL" clId="{15F38F77-5154-6344-B0CC-E8BE3C6E9BB9}" dt="2018-10-08T14:54:45.414" v="14"/>
-        <pc:sldMkLst>
-          <pc:docMk/>
-          <pc:sldMk cId="3500512874" sldId="263"/>
-        </pc:sldMkLst>
-      </pc:sldChg>
-      <pc:sldChg chg="add">
-        <pc:chgData name="Song, Lixing" userId="d86a4794-d57c-4f6d-acee-3349d9d3edfc" providerId="ADAL" clId="{15F38F77-5154-6344-B0CC-E8BE3C6E9BB9}" dt="2018-10-08T14:54:45.414" v="14"/>
-        <pc:sldMkLst>
-          <pc:docMk/>
-          <pc:sldMk cId="800275729" sldId="264"/>
-        </pc:sldMkLst>
-      </pc:sldChg>
-      <pc:sldChg chg="addSp delSp modSp add">
-        <pc:chgData name="Song, Lixing" userId="d86a4794-d57c-4f6d-acee-3349d9d3edfc" providerId="ADAL" clId="{15F38F77-5154-6344-B0CC-E8BE3C6E9BB9}" dt="2018-10-08T14:56:24.500" v="24" actId="14100"/>
-        <pc:sldMkLst>
-          <pc:docMk/>
-          <pc:sldMk cId="2620615987" sldId="265"/>
-        </pc:sldMkLst>
-        <pc:spChg chg="add del mod">
-          <ac:chgData name="Song, Lixing" userId="d86a4794-d57c-4f6d-acee-3349d9d3edfc" providerId="ADAL" clId="{15F38F77-5154-6344-B0CC-E8BE3C6E9BB9}" dt="2018-10-08T14:55:28.888" v="21"/>
-          <ac:spMkLst>
-            <pc:docMk/>
-            <pc:sldMk cId="2620615987" sldId="265"/>
-            <ac:spMk id="2" creationId="{C1CBFDCB-1E04-3B43-8661-19DC46141BC4}"/>
-          </ac:spMkLst>
-        </pc:spChg>
-        <pc:spChg chg="add del mod">
-          <ac:chgData name="Song, Lixing" userId="d86a4794-d57c-4f6d-acee-3349d9d3edfc" providerId="ADAL" clId="{15F38F77-5154-6344-B0CC-E8BE3C6E9BB9}" dt="2018-10-08T14:55:28.888" v="21"/>
-          <ac:spMkLst>
-            <pc:docMk/>
-            <pc:sldMk cId="2620615987" sldId="265"/>
-            <ac:spMk id="3" creationId="{C6282702-C0A9-A34F-9173-9B4B5863D11F}"/>
-          </ac:spMkLst>
-        </pc:spChg>
-        <pc:spChg chg="mod">
-          <ac:chgData name="Song, Lixing" userId="d86a4794-d57c-4f6d-acee-3349d9d3edfc" providerId="ADAL" clId="{15F38F77-5154-6344-B0CC-E8BE3C6E9BB9}" dt="2018-10-08T14:56:24.500" v="24" actId="14100"/>
-          <ac:spMkLst>
-            <pc:docMk/>
-            <pc:sldMk cId="2620615987" sldId="265"/>
-            <ac:spMk id="196" creationId="{00000000-0000-0000-0000-000000000000}"/>
-          </ac:spMkLst>
-        </pc:spChg>
-      </pc:sldChg>
-      <pc:sldChg chg="add">
-        <pc:chgData name="Song, Lixing" userId="d86a4794-d57c-4f6d-acee-3349d9d3edfc" providerId="ADAL" clId="{15F38F77-5154-6344-B0CC-E8BE3C6E9BB9}" dt="2018-10-08T14:54:45.414" v="14"/>
-        <pc:sldMkLst>
-          <pc:docMk/>
-          <pc:sldMk cId="319598819" sldId="266"/>
-        </pc:sldMkLst>
-      </pc:sldChg>
-      <pc:sldChg chg="add">
-        <pc:chgData name="Song, Lixing" userId="d86a4794-d57c-4f6d-acee-3349d9d3edfc" providerId="ADAL" clId="{15F38F77-5154-6344-B0CC-E8BE3C6E9BB9}" dt="2018-10-08T14:54:45.414" v="14"/>
-        <pc:sldMkLst>
-          <pc:docMk/>
-          <pc:sldMk cId="2603308066" sldId="269"/>
-        </pc:sldMkLst>
-      </pc:sldChg>
-    </pc:docChg>
-  </pc:docChgLst>
-</pc:chgInfo>
-</file>
-
 <file path=ppt/handoutMasters/handoutMaster1.xml><?xml version="1.0" encoding="utf-8"?>
 <p:handoutMaster xmlns:a="http://schemas.openxmlformats.org/drawingml/2006/main" xmlns:r="http://schemas.openxmlformats.org/officeDocument/2006/relationships" xmlns:p="http://schemas.openxmlformats.org/presentationml/2006/main">
   <p:cSld>
@@ -767,7 +227,7 @@
           <a:p>
             <a:fld id="{B2F99CBE-2880-364F-A223-8E393E38EFAB}" type="datetimeFigureOut">
               <a:rPr lang="en-US" smtClean="0"/>
-              <a:t>12/18/2018</a:t>
+              <a:t>3/21/2019</a:t>
             </a:fld>
             <a:endParaRPr lang="en-US"/>
           </a:p>
@@ -944,7 +404,7 @@
           <a:p>
             <a:fld id="{8D9AE51D-F948-044F-B984-1DA50063DADE}" type="datetimeFigureOut">
               <a:rPr lang="en-US" smtClean="0"/>
-              <a:t>12/18/2018</a:t>
+              <a:t>3/21/2019</a:t>
             </a:fld>
             <a:endParaRPr lang="en-US"/>
           </a:p>
@@ -2859,7 +2319,7 @@
           <a:p>
             <a:fld id="{82A73E24-5133-184A-B08C-013331FC8007}" type="datetimeFigureOut">
               <a:rPr lang="en-US" smtClean="0"/>
-              <a:t>12/18/2018</a:t>
+              <a:t>3/21/2019</a:t>
             </a:fld>
             <a:endParaRPr lang="en-US"/>
           </a:p>
@@ -3221,7 +2681,7 @@
           <a:p>
             <a:fld id="{82A73E24-5133-184A-B08C-013331FC8007}" type="datetimeFigureOut">
               <a:rPr lang="en-US" smtClean="0"/>
-              <a:t>12/18/2018</a:t>
+              <a:t>3/21/2019</a:t>
             </a:fld>
             <a:endParaRPr lang="en-US"/>
           </a:p>
@@ -3429,7 +2889,7 @@
           <a:p>
             <a:fld id="{82A73E24-5133-184A-B08C-013331FC8007}" type="datetimeFigureOut">
               <a:rPr lang="en-US" smtClean="0"/>
-              <a:t>12/18/2018</a:t>
+              <a:t>3/21/2019</a:t>
             </a:fld>
             <a:endParaRPr lang="en-US"/>
           </a:p>
@@ -4507,7 +3967,7 @@
           <a:p>
             <a:fld id="{82A73E24-5133-184A-B08C-013331FC8007}" type="datetimeFigureOut">
               <a:rPr lang="en-US" smtClean="0"/>
-              <a:t>12/18/2018</a:t>
+              <a:t>3/21/2019</a:t>
             </a:fld>
             <a:endParaRPr lang="en-US"/>
           </a:p>
@@ -4861,7 +4321,7 @@
           <a:p>
             <a:fld id="{82A73E24-5133-184A-B08C-013331FC8007}" type="datetimeFigureOut">
               <a:rPr lang="en-US" smtClean="0"/>
-              <a:t>12/18/2018</a:t>
+              <a:t>3/21/2019</a:t>
             </a:fld>
             <a:endParaRPr lang="en-US"/>
           </a:p>
@@ -5126,7 +4586,7 @@
           <a:p>
             <a:fld id="{82A73E24-5133-184A-B08C-013331FC8007}" type="datetimeFigureOut">
               <a:rPr lang="en-US" smtClean="0"/>
-              <a:t>12/18/2018</a:t>
+              <a:t>3/21/2019</a:t>
             </a:fld>
             <a:endParaRPr lang="en-US"/>
           </a:p>
@@ -5538,7 +4998,7 @@
           <a:p>
             <a:fld id="{82A73E24-5133-184A-B08C-013331FC8007}" type="datetimeFigureOut">
               <a:rPr lang="en-US" smtClean="0"/>
-              <a:t>12/18/2018</a:t>
+              <a:t>3/21/2019</a:t>
             </a:fld>
             <a:endParaRPr lang="en-US"/>
           </a:p>
@@ -5679,7 +5139,7 @@
           <a:p>
             <a:fld id="{82A73E24-5133-184A-B08C-013331FC8007}" type="datetimeFigureOut">
               <a:rPr lang="en-US" smtClean="0"/>
-              <a:t>12/18/2018</a:t>
+              <a:t>3/21/2019</a:t>
             </a:fld>
             <a:endParaRPr lang="en-US"/>
           </a:p>
@@ -5792,7 +5252,7 @@
           <a:p>
             <a:fld id="{82A73E24-5133-184A-B08C-013331FC8007}" type="datetimeFigureOut">
               <a:rPr lang="en-US" smtClean="0"/>
-              <a:t>12/18/2018</a:t>
+              <a:t>3/21/2019</a:t>
             </a:fld>
             <a:endParaRPr lang="en-US"/>
           </a:p>
@@ -6103,7 +5563,7 @@
           <a:p>
             <a:fld id="{82A73E24-5133-184A-B08C-013331FC8007}" type="datetimeFigureOut">
               <a:rPr lang="en-US" smtClean="0"/>
-              <a:t>12/18/2018</a:t>
+              <a:t>3/21/2019</a:t>
             </a:fld>
             <a:endParaRPr lang="en-US"/>
           </a:p>
@@ -6394,7 +5854,7 @@
           <a:p>
             <a:fld id="{82A73E24-5133-184A-B08C-013331FC8007}" type="datetimeFigureOut">
               <a:rPr lang="en-US" smtClean="0"/>
-              <a:t>12/18/2018</a:t>
+              <a:t>3/21/2019</a:t>
             </a:fld>
             <a:endParaRPr lang="en-US"/>
           </a:p>
@@ -6635,7 +6095,7 @@
           <a:p>
             <a:fld id="{82A73E24-5133-184A-B08C-013331FC8007}" type="datetimeFigureOut">
               <a:rPr lang="en-US" smtClean="0"/>
-              <a:t>12/18/2018</a:t>
+              <a:t>3/21/2019</a:t>
             </a:fld>
             <a:endParaRPr lang="en-US"/>
           </a:p>
@@ -7119,7 +6579,7 @@
           <a:p>
             <a:fld id="{B7B09853-F130-A44D-A7BC-226D14CA7C56}" type="datetime2">
               <a:rPr lang="en-US" smtClean="0"/>
-              <a:t>Tuesday, December 18, 2018</a:t>
+              <a:t>Thursday, March 21, 2019</a:t>
             </a:fld>
             <a:endParaRPr lang="en-US" dirty="0"/>
           </a:p>
@@ -8108,7 +7568,7 @@
           <p:cNvPr id="2" name="Title 1">
             <a:extLst>
               <a:ext uri="{FF2B5EF4-FFF2-40B4-BE49-F238E27FC236}">
-                <a16:creationId xmlns:a16="http://schemas.microsoft.com/office/drawing/2014/main" id="{C590BAF5-6A35-4A85-A3BE-04B99FCF8983}"/>
+                <a16:creationId xmlns:a16="http://schemas.microsoft.com/office/drawing/2014/main" id="{43BA9B26-3E17-407C-8301-E06A387CA090}"/>
               </a:ext>
             </a:extLst>
           </p:cNvPr>
@@ -8128,7 +7588,7 @@
               <a:rPr lang="en-US" dirty="0">
                 <a:cs typeface="Calibri Light"/>
               </a:rPr>
-              <a:t>In Class Activity</a:t>
+              <a:t>Moodle Quiz</a:t>
             </a:r>
             <a:endParaRPr lang="en-US" dirty="0"/>
           </a:p>
@@ -8139,7 +7599,7 @@
           <p:cNvPr id="3" name="Content Placeholder 2">
             <a:extLst>
               <a:ext uri="{FF2B5EF4-FFF2-40B4-BE49-F238E27FC236}">
-                <a16:creationId xmlns:a16="http://schemas.microsoft.com/office/drawing/2014/main" id="{8AC0F993-B0AA-4C16-8F7F-3B8D25C660A8}"/>
+                <a16:creationId xmlns:a16="http://schemas.microsoft.com/office/drawing/2014/main" id="{010DFB9F-B339-4293-9B9F-A3816738D13B}"/>
               </a:ext>
             </a:extLst>
           </p:cNvPr>
@@ -8152,17 +7612,32 @@
         </p:nvSpPr>
         <p:spPr/>
         <p:txBody>
-          <a:bodyPr/>
-          <a:lstStyle/>
-          <a:p>
-            <a:endParaRPr lang="en-US"/>
+          <a:bodyPr vert="horz" lIns="91440" tIns="45720" rIns="91440" bIns="45720" rtlCol="0" anchor="t">
+            <a:normAutofit/>
+          </a:bodyPr>
+          <a:lstStyle/>
+          <a:p>
+            <a:r>
+              <a:rPr lang="en-US" dirty="0">
+                <a:cs typeface="Calibri"/>
+              </a:rPr>
+              <a:t>Look for "CPU Scheduling 2 In-Class"</a:t>
+            </a:r>
+          </a:p>
+          <a:p>
+            <a:r>
+              <a:rPr lang="en-US" dirty="0">
+                <a:cs typeface="Calibri"/>
+              </a:rPr>
+              <a:t>You have unlimited tries</a:t>
+            </a:r>
           </a:p>
         </p:txBody>
       </p:sp>
     </p:spTree>
     <p:extLst>
       <p:ext uri="{BB962C8B-B14F-4D97-AF65-F5344CB8AC3E}">
-        <p14:creationId xmlns:p14="http://schemas.microsoft.com/office/powerpoint/2010/main" val="2079174257"/>
+        <p14:creationId xmlns:p14="http://schemas.microsoft.com/office/powerpoint/2010/main" val="3480990622"/>
       </p:ext>
     </p:extLst>
   </p:cSld>

</xml_diff>